<commit_message>
Update L01P02 - Week 08 - PIR_KNOP_LED.pptx
</commit_message>
<xml_diff>
--- a/L01P02 - Smart Technology - Tinkercad - Arduino/L01P02 - LES 08 - PIR/L01P02 - Week 08 - PIR_KNOP_LED.pptx
+++ b/L01P02 - Smart Technology - Tinkercad - Arduino/L01P02 - LES 08 - PIR/L01P02 - Week 08 - PIR_KNOP_LED.pptx
@@ -6,10 +6,10 @@
     <p:sldMasterId id="2147483670" r:id="rId5"/>
   </p:sldMasterIdLst>
   <p:notesMasterIdLst>
-    <p:notesMasterId r:id="rId28"/>
+    <p:notesMasterId r:id="rId31"/>
   </p:notesMasterIdLst>
   <p:handoutMasterIdLst>
-    <p:handoutMasterId r:id="rId29"/>
+    <p:handoutMasterId r:id="rId32"/>
   </p:handoutMasterIdLst>
   <p:sldIdLst>
     <p:sldId id="256" r:id="rId6"/>
@@ -18,22 +18,25 @@
     <p:sldId id="389" r:id="rId9"/>
     <p:sldId id="391" r:id="rId10"/>
     <p:sldId id="392" r:id="rId11"/>
-    <p:sldId id="393" r:id="rId12"/>
-    <p:sldId id="394" r:id="rId13"/>
-    <p:sldId id="395" r:id="rId14"/>
-    <p:sldId id="396" r:id="rId15"/>
-    <p:sldId id="397" r:id="rId16"/>
-    <p:sldId id="398" r:id="rId17"/>
-    <p:sldId id="399" r:id="rId18"/>
-    <p:sldId id="400" r:id="rId19"/>
-    <p:sldId id="401" r:id="rId20"/>
-    <p:sldId id="402" r:id="rId21"/>
-    <p:sldId id="403" r:id="rId22"/>
-    <p:sldId id="404" r:id="rId23"/>
-    <p:sldId id="405" r:id="rId24"/>
-    <p:sldId id="407" r:id="rId25"/>
-    <p:sldId id="406" r:id="rId26"/>
-    <p:sldId id="387" r:id="rId27"/>
+    <p:sldId id="408" r:id="rId12"/>
+    <p:sldId id="409" r:id="rId13"/>
+    <p:sldId id="410" r:id="rId14"/>
+    <p:sldId id="393" r:id="rId15"/>
+    <p:sldId id="394" r:id="rId16"/>
+    <p:sldId id="395" r:id="rId17"/>
+    <p:sldId id="396" r:id="rId18"/>
+    <p:sldId id="397" r:id="rId19"/>
+    <p:sldId id="398" r:id="rId20"/>
+    <p:sldId id="399" r:id="rId21"/>
+    <p:sldId id="400" r:id="rId22"/>
+    <p:sldId id="401" r:id="rId23"/>
+    <p:sldId id="402" r:id="rId24"/>
+    <p:sldId id="403" r:id="rId25"/>
+    <p:sldId id="404" r:id="rId26"/>
+    <p:sldId id="405" r:id="rId27"/>
+    <p:sldId id="407" r:id="rId28"/>
+    <p:sldId id="406" r:id="rId29"/>
+    <p:sldId id="387" r:id="rId30"/>
   </p:sldIdLst>
   <p:sldSz cx="12192000" cy="6858000"/>
   <p:notesSz cx="6797675" cy="9926638"/>
@@ -1393,138 +1396,6 @@
     </pc:docChg>
   </pc:docChgLst>
   <pc:docChgLst>
-    <pc:chgData name="Arjan Kamberg" userId="2cfeac95-aab1-41a7-bca5-796b19d85bc0" providerId="ADAL" clId="{1E541830-C041-E442-ADEF-4748105A6526}"/>
-    <pc:docChg chg="modSld">
-      <pc:chgData name="Arjan Kamberg" userId="2cfeac95-aab1-41a7-bca5-796b19d85bc0" providerId="ADAL" clId="{1E541830-C041-E442-ADEF-4748105A6526}" dt="2023-01-11T17:07:07.673" v="0" actId="20577"/>
-      <pc:docMkLst>
-        <pc:docMk/>
-      </pc:docMkLst>
-      <pc:sldChg chg="modSp mod">
-        <pc:chgData name="Arjan Kamberg" userId="2cfeac95-aab1-41a7-bca5-796b19d85bc0" providerId="ADAL" clId="{1E541830-C041-E442-ADEF-4748105A6526}" dt="2023-01-11T17:07:07.673" v="0" actId="20577"/>
-        <pc:sldMkLst>
-          <pc:docMk/>
-          <pc:sldMk cId="248983296" sldId="256"/>
-        </pc:sldMkLst>
-        <pc:spChg chg="mod">
-          <ac:chgData name="Arjan Kamberg" userId="2cfeac95-aab1-41a7-bca5-796b19d85bc0" providerId="ADAL" clId="{1E541830-C041-E442-ADEF-4748105A6526}" dt="2023-01-11T17:07:07.673" v="0" actId="20577"/>
-          <ac:spMkLst>
-            <pc:docMk/>
-            <pc:sldMk cId="248983296" sldId="256"/>
-            <ac:spMk id="8" creationId="{504648F9-71D5-4088-A705-93B3953EDA91}"/>
-          </ac:spMkLst>
-        </pc:spChg>
-      </pc:sldChg>
-    </pc:docChg>
-  </pc:docChgLst>
-  <pc:docChgLst>
-    <pc:chgData name="Arjan Kamberg" userId="2cfeac95-aab1-41a7-bca5-796b19d85bc0" providerId="ADAL" clId="{CAC0DE05-FB81-B247-909C-B48A7A198DF2}"/>
-    <pc:docChg chg="custSel delSld modSld">
-      <pc:chgData name="Arjan Kamberg" userId="2cfeac95-aab1-41a7-bca5-796b19d85bc0" providerId="ADAL" clId="{CAC0DE05-FB81-B247-909C-B48A7A198DF2}" dt="2022-03-07T16:47:46.935" v="12" actId="2696"/>
-      <pc:docMkLst>
-        <pc:docMk/>
-      </pc:docMkLst>
-      <pc:sldChg chg="delSp mod">
-        <pc:chgData name="Arjan Kamberg" userId="2cfeac95-aab1-41a7-bca5-796b19d85bc0" providerId="ADAL" clId="{CAC0DE05-FB81-B247-909C-B48A7A198DF2}" dt="2022-03-07T16:47:39.715" v="0" actId="478"/>
-        <pc:sldMkLst>
-          <pc:docMk/>
-          <pc:sldMk cId="1212195962" sldId="388"/>
-        </pc:sldMkLst>
-        <pc:picChg chg="del">
-          <ac:chgData name="Arjan Kamberg" userId="2cfeac95-aab1-41a7-bca5-796b19d85bc0" providerId="ADAL" clId="{CAC0DE05-FB81-B247-909C-B48A7A198DF2}" dt="2022-03-07T16:47:39.715" v="0" actId="478"/>
-          <ac:picMkLst>
-            <pc:docMk/>
-            <pc:sldMk cId="1212195962" sldId="388"/>
-            <ac:picMk id="4" creationId="{28B0F8B2-CE90-BF47-8DC1-374E488D84FD}"/>
-          </ac:picMkLst>
-        </pc:picChg>
-      </pc:sldChg>
-      <pc:sldChg chg="del">
-        <pc:chgData name="Arjan Kamberg" userId="2cfeac95-aab1-41a7-bca5-796b19d85bc0" providerId="ADAL" clId="{CAC0DE05-FB81-B247-909C-B48A7A198DF2}" dt="2022-03-07T16:47:42.187" v="1" actId="2696"/>
-        <pc:sldMkLst>
-          <pc:docMk/>
-          <pc:sldMk cId="3665043672" sldId="389"/>
-        </pc:sldMkLst>
-      </pc:sldChg>
-      <pc:sldChg chg="del">
-        <pc:chgData name="Arjan Kamberg" userId="2cfeac95-aab1-41a7-bca5-796b19d85bc0" providerId="ADAL" clId="{CAC0DE05-FB81-B247-909C-B48A7A198DF2}" dt="2022-03-07T16:47:42.654" v="2" actId="2696"/>
-        <pc:sldMkLst>
-          <pc:docMk/>
-          <pc:sldMk cId="2283350102" sldId="390"/>
-        </pc:sldMkLst>
-      </pc:sldChg>
-      <pc:sldChg chg="del">
-        <pc:chgData name="Arjan Kamberg" userId="2cfeac95-aab1-41a7-bca5-796b19d85bc0" providerId="ADAL" clId="{CAC0DE05-FB81-B247-909C-B48A7A198DF2}" dt="2022-03-07T16:47:43.018" v="3" actId="2696"/>
-        <pc:sldMkLst>
-          <pc:docMk/>
-          <pc:sldMk cId="2079557222" sldId="391"/>
-        </pc:sldMkLst>
-      </pc:sldChg>
-      <pc:sldChg chg="del">
-        <pc:chgData name="Arjan Kamberg" userId="2cfeac95-aab1-41a7-bca5-796b19d85bc0" providerId="ADAL" clId="{CAC0DE05-FB81-B247-909C-B48A7A198DF2}" dt="2022-03-07T16:47:43.422" v="4" actId="2696"/>
-        <pc:sldMkLst>
-          <pc:docMk/>
-          <pc:sldMk cId="899573104" sldId="392"/>
-        </pc:sldMkLst>
-      </pc:sldChg>
-      <pc:sldChg chg="del">
-        <pc:chgData name="Arjan Kamberg" userId="2cfeac95-aab1-41a7-bca5-796b19d85bc0" providerId="ADAL" clId="{CAC0DE05-FB81-B247-909C-B48A7A198DF2}" dt="2022-03-07T16:47:44.253" v="6" actId="2696"/>
-        <pc:sldMkLst>
-          <pc:docMk/>
-          <pc:sldMk cId="3808281892" sldId="393"/>
-        </pc:sldMkLst>
-      </pc:sldChg>
-      <pc:sldChg chg="del">
-        <pc:chgData name="Arjan Kamberg" userId="2cfeac95-aab1-41a7-bca5-796b19d85bc0" providerId="ADAL" clId="{CAC0DE05-FB81-B247-909C-B48A7A198DF2}" dt="2022-03-07T16:47:43.841" v="5" actId="2696"/>
-        <pc:sldMkLst>
-          <pc:docMk/>
-          <pc:sldMk cId="599577290" sldId="395"/>
-        </pc:sldMkLst>
-      </pc:sldChg>
-      <pc:sldChg chg="del">
-        <pc:chgData name="Arjan Kamberg" userId="2cfeac95-aab1-41a7-bca5-796b19d85bc0" providerId="ADAL" clId="{CAC0DE05-FB81-B247-909C-B48A7A198DF2}" dt="2022-03-07T16:47:45.184" v="8" actId="2696"/>
-        <pc:sldMkLst>
-          <pc:docMk/>
-          <pc:sldMk cId="1216635248" sldId="396"/>
-        </pc:sldMkLst>
-      </pc:sldChg>
-      <pc:sldChg chg="del">
-        <pc:chgData name="Arjan Kamberg" userId="2cfeac95-aab1-41a7-bca5-796b19d85bc0" providerId="ADAL" clId="{CAC0DE05-FB81-B247-909C-B48A7A198DF2}" dt="2022-03-07T16:47:44.647" v="7" actId="2696"/>
-        <pc:sldMkLst>
-          <pc:docMk/>
-          <pc:sldMk cId="3301830037" sldId="397"/>
-        </pc:sldMkLst>
-      </pc:sldChg>
-      <pc:sldChg chg="del">
-        <pc:chgData name="Arjan Kamberg" userId="2cfeac95-aab1-41a7-bca5-796b19d85bc0" providerId="ADAL" clId="{CAC0DE05-FB81-B247-909C-B48A7A198DF2}" dt="2022-03-07T16:47:45.622" v="9" actId="2696"/>
-        <pc:sldMkLst>
-          <pc:docMk/>
-          <pc:sldMk cId="4032235498" sldId="398"/>
-        </pc:sldMkLst>
-      </pc:sldChg>
-      <pc:sldChg chg="del">
-        <pc:chgData name="Arjan Kamberg" userId="2cfeac95-aab1-41a7-bca5-796b19d85bc0" providerId="ADAL" clId="{CAC0DE05-FB81-B247-909C-B48A7A198DF2}" dt="2022-03-07T16:47:46.124" v="10" actId="2696"/>
-        <pc:sldMkLst>
-          <pc:docMk/>
-          <pc:sldMk cId="3447936170" sldId="399"/>
-        </pc:sldMkLst>
-      </pc:sldChg>
-      <pc:sldChg chg="del">
-        <pc:chgData name="Arjan Kamberg" userId="2cfeac95-aab1-41a7-bca5-796b19d85bc0" providerId="ADAL" clId="{CAC0DE05-FB81-B247-909C-B48A7A198DF2}" dt="2022-03-07T16:47:46.533" v="11" actId="2696"/>
-        <pc:sldMkLst>
-          <pc:docMk/>
-          <pc:sldMk cId="1869224072" sldId="400"/>
-        </pc:sldMkLst>
-      </pc:sldChg>
-      <pc:sldChg chg="del">
-        <pc:chgData name="Arjan Kamberg" userId="2cfeac95-aab1-41a7-bca5-796b19d85bc0" providerId="ADAL" clId="{CAC0DE05-FB81-B247-909C-B48A7A198DF2}" dt="2022-03-07T16:47:46.935" v="12" actId="2696"/>
-        <pc:sldMkLst>
-          <pc:docMk/>
-          <pc:sldMk cId="239890730" sldId="401"/>
-        </pc:sldMkLst>
-      </pc:sldChg>
-    </pc:docChg>
-  </pc:docChgLst>
-  <pc:docChgLst>
     <pc:chgData name="Arjan Kamberg" userId="2cfeac95-aab1-41a7-bca5-796b19d85bc0" providerId="ADAL" clId="{F79FAF97-4546-FA4E-8B77-E1D705A7800E}"/>
     <pc:docChg chg="modSld">
       <pc:chgData name="Arjan Kamberg" userId="2cfeac95-aab1-41a7-bca5-796b19d85bc0" providerId="ADAL" clId="{F79FAF97-4546-FA4E-8B77-E1D705A7800E}" dt="2021-03-25T21:17:23.177" v="4"/>
@@ -1566,6 +1437,30 @@
             <pc:docMk/>
             <pc:sldMk cId="3714023842" sldId="361"/>
             <ac:spMk id="2" creationId="{FF96216C-A868-884D-9867-B0E0AF546CB8}"/>
+          </ac:spMkLst>
+        </pc:spChg>
+      </pc:sldChg>
+    </pc:docChg>
+  </pc:docChgLst>
+  <pc:docChgLst>
+    <pc:chgData name="Arjan Kamberg" userId="2cfeac95-aab1-41a7-bca5-796b19d85bc0" providerId="ADAL" clId="{1E541830-C041-E442-ADEF-4748105A6526}"/>
+    <pc:docChg chg="modSld">
+      <pc:chgData name="Arjan Kamberg" userId="2cfeac95-aab1-41a7-bca5-796b19d85bc0" providerId="ADAL" clId="{1E541830-C041-E442-ADEF-4748105A6526}" dt="2023-01-11T17:07:07.673" v="0" actId="20577"/>
+      <pc:docMkLst>
+        <pc:docMk/>
+      </pc:docMkLst>
+      <pc:sldChg chg="modSp mod">
+        <pc:chgData name="Arjan Kamberg" userId="2cfeac95-aab1-41a7-bca5-796b19d85bc0" providerId="ADAL" clId="{1E541830-C041-E442-ADEF-4748105A6526}" dt="2023-01-11T17:07:07.673" v="0" actId="20577"/>
+        <pc:sldMkLst>
+          <pc:docMk/>
+          <pc:sldMk cId="248983296" sldId="256"/>
+        </pc:sldMkLst>
+        <pc:spChg chg="mod">
+          <ac:chgData name="Arjan Kamberg" userId="2cfeac95-aab1-41a7-bca5-796b19d85bc0" providerId="ADAL" clId="{1E541830-C041-E442-ADEF-4748105A6526}" dt="2023-01-11T17:07:07.673" v="0" actId="20577"/>
+          <ac:spMkLst>
+            <pc:docMk/>
+            <pc:sldMk cId="248983296" sldId="256"/>
+            <ac:spMk id="8" creationId="{504648F9-71D5-4088-A705-93B3953EDA91}"/>
           </ac:spMkLst>
         </pc:spChg>
       </pc:sldChg>
@@ -2107,6 +2002,114 @@
       </pc:sldChg>
     </pc:docChg>
   </pc:docChgLst>
+  <pc:docChgLst>
+    <pc:chgData name="Arjan Kamberg" userId="2cfeac95-aab1-41a7-bca5-796b19d85bc0" providerId="ADAL" clId="{CAC0DE05-FB81-B247-909C-B48A7A198DF2}"/>
+    <pc:docChg chg="custSel delSld modSld">
+      <pc:chgData name="Arjan Kamberg" userId="2cfeac95-aab1-41a7-bca5-796b19d85bc0" providerId="ADAL" clId="{CAC0DE05-FB81-B247-909C-B48A7A198DF2}" dt="2022-03-07T16:47:46.935" v="12" actId="2696"/>
+      <pc:docMkLst>
+        <pc:docMk/>
+      </pc:docMkLst>
+      <pc:sldChg chg="delSp mod">
+        <pc:chgData name="Arjan Kamberg" userId="2cfeac95-aab1-41a7-bca5-796b19d85bc0" providerId="ADAL" clId="{CAC0DE05-FB81-B247-909C-B48A7A198DF2}" dt="2022-03-07T16:47:39.715" v="0" actId="478"/>
+        <pc:sldMkLst>
+          <pc:docMk/>
+          <pc:sldMk cId="1212195962" sldId="388"/>
+        </pc:sldMkLst>
+        <pc:picChg chg="del">
+          <ac:chgData name="Arjan Kamberg" userId="2cfeac95-aab1-41a7-bca5-796b19d85bc0" providerId="ADAL" clId="{CAC0DE05-FB81-B247-909C-B48A7A198DF2}" dt="2022-03-07T16:47:39.715" v="0" actId="478"/>
+          <ac:picMkLst>
+            <pc:docMk/>
+            <pc:sldMk cId="1212195962" sldId="388"/>
+            <ac:picMk id="4" creationId="{28B0F8B2-CE90-BF47-8DC1-374E488D84FD}"/>
+          </ac:picMkLst>
+        </pc:picChg>
+      </pc:sldChg>
+      <pc:sldChg chg="del">
+        <pc:chgData name="Arjan Kamberg" userId="2cfeac95-aab1-41a7-bca5-796b19d85bc0" providerId="ADAL" clId="{CAC0DE05-FB81-B247-909C-B48A7A198DF2}" dt="2022-03-07T16:47:42.187" v="1" actId="2696"/>
+        <pc:sldMkLst>
+          <pc:docMk/>
+          <pc:sldMk cId="3665043672" sldId="389"/>
+        </pc:sldMkLst>
+      </pc:sldChg>
+      <pc:sldChg chg="del">
+        <pc:chgData name="Arjan Kamberg" userId="2cfeac95-aab1-41a7-bca5-796b19d85bc0" providerId="ADAL" clId="{CAC0DE05-FB81-B247-909C-B48A7A198DF2}" dt="2022-03-07T16:47:42.654" v="2" actId="2696"/>
+        <pc:sldMkLst>
+          <pc:docMk/>
+          <pc:sldMk cId="2283350102" sldId="390"/>
+        </pc:sldMkLst>
+      </pc:sldChg>
+      <pc:sldChg chg="del">
+        <pc:chgData name="Arjan Kamberg" userId="2cfeac95-aab1-41a7-bca5-796b19d85bc0" providerId="ADAL" clId="{CAC0DE05-FB81-B247-909C-B48A7A198DF2}" dt="2022-03-07T16:47:43.018" v="3" actId="2696"/>
+        <pc:sldMkLst>
+          <pc:docMk/>
+          <pc:sldMk cId="2079557222" sldId="391"/>
+        </pc:sldMkLst>
+      </pc:sldChg>
+      <pc:sldChg chg="del">
+        <pc:chgData name="Arjan Kamberg" userId="2cfeac95-aab1-41a7-bca5-796b19d85bc0" providerId="ADAL" clId="{CAC0DE05-FB81-B247-909C-B48A7A198DF2}" dt="2022-03-07T16:47:43.422" v="4" actId="2696"/>
+        <pc:sldMkLst>
+          <pc:docMk/>
+          <pc:sldMk cId="899573104" sldId="392"/>
+        </pc:sldMkLst>
+      </pc:sldChg>
+      <pc:sldChg chg="del">
+        <pc:chgData name="Arjan Kamberg" userId="2cfeac95-aab1-41a7-bca5-796b19d85bc0" providerId="ADAL" clId="{CAC0DE05-FB81-B247-909C-B48A7A198DF2}" dt="2022-03-07T16:47:44.253" v="6" actId="2696"/>
+        <pc:sldMkLst>
+          <pc:docMk/>
+          <pc:sldMk cId="3808281892" sldId="393"/>
+        </pc:sldMkLst>
+      </pc:sldChg>
+      <pc:sldChg chg="del">
+        <pc:chgData name="Arjan Kamberg" userId="2cfeac95-aab1-41a7-bca5-796b19d85bc0" providerId="ADAL" clId="{CAC0DE05-FB81-B247-909C-B48A7A198DF2}" dt="2022-03-07T16:47:43.841" v="5" actId="2696"/>
+        <pc:sldMkLst>
+          <pc:docMk/>
+          <pc:sldMk cId="599577290" sldId="395"/>
+        </pc:sldMkLst>
+      </pc:sldChg>
+      <pc:sldChg chg="del">
+        <pc:chgData name="Arjan Kamberg" userId="2cfeac95-aab1-41a7-bca5-796b19d85bc0" providerId="ADAL" clId="{CAC0DE05-FB81-B247-909C-B48A7A198DF2}" dt="2022-03-07T16:47:45.184" v="8" actId="2696"/>
+        <pc:sldMkLst>
+          <pc:docMk/>
+          <pc:sldMk cId="1216635248" sldId="396"/>
+        </pc:sldMkLst>
+      </pc:sldChg>
+      <pc:sldChg chg="del">
+        <pc:chgData name="Arjan Kamberg" userId="2cfeac95-aab1-41a7-bca5-796b19d85bc0" providerId="ADAL" clId="{CAC0DE05-FB81-B247-909C-B48A7A198DF2}" dt="2022-03-07T16:47:44.647" v="7" actId="2696"/>
+        <pc:sldMkLst>
+          <pc:docMk/>
+          <pc:sldMk cId="3301830037" sldId="397"/>
+        </pc:sldMkLst>
+      </pc:sldChg>
+      <pc:sldChg chg="del">
+        <pc:chgData name="Arjan Kamberg" userId="2cfeac95-aab1-41a7-bca5-796b19d85bc0" providerId="ADAL" clId="{CAC0DE05-FB81-B247-909C-B48A7A198DF2}" dt="2022-03-07T16:47:45.622" v="9" actId="2696"/>
+        <pc:sldMkLst>
+          <pc:docMk/>
+          <pc:sldMk cId="4032235498" sldId="398"/>
+        </pc:sldMkLst>
+      </pc:sldChg>
+      <pc:sldChg chg="del">
+        <pc:chgData name="Arjan Kamberg" userId="2cfeac95-aab1-41a7-bca5-796b19d85bc0" providerId="ADAL" clId="{CAC0DE05-FB81-B247-909C-B48A7A198DF2}" dt="2022-03-07T16:47:46.124" v="10" actId="2696"/>
+        <pc:sldMkLst>
+          <pc:docMk/>
+          <pc:sldMk cId="3447936170" sldId="399"/>
+        </pc:sldMkLst>
+      </pc:sldChg>
+      <pc:sldChg chg="del">
+        <pc:chgData name="Arjan Kamberg" userId="2cfeac95-aab1-41a7-bca5-796b19d85bc0" providerId="ADAL" clId="{CAC0DE05-FB81-B247-909C-B48A7A198DF2}" dt="2022-03-07T16:47:46.533" v="11" actId="2696"/>
+        <pc:sldMkLst>
+          <pc:docMk/>
+          <pc:sldMk cId="1869224072" sldId="400"/>
+        </pc:sldMkLst>
+      </pc:sldChg>
+      <pc:sldChg chg="del">
+        <pc:chgData name="Arjan Kamberg" userId="2cfeac95-aab1-41a7-bca5-796b19d85bc0" providerId="ADAL" clId="{CAC0DE05-FB81-B247-909C-B48A7A198DF2}" dt="2022-03-07T16:47:46.935" v="12" actId="2696"/>
+        <pc:sldMkLst>
+          <pc:docMk/>
+          <pc:sldMk cId="239890730" sldId="401"/>
+        </pc:sldMkLst>
+      </pc:sldChg>
+    </pc:docChg>
+  </pc:docChgLst>
 </pc:chgInfo>
 </file>
 
@@ -2192,7 +2195,7 @@
           <a:p>
             <a:fld id="{25ED37B6-3D2B-42F6-B75F-7E9C925A2B78}" type="datetimeFigureOut">
               <a:rPr lang="nl-NL" smtClean="0"/>
-              <a:t>11-01-2023</a:t>
+              <a:t>15-12-2023</a:t>
             </a:fld>
             <a:endParaRPr lang="nl-NL"/>
           </a:p>
@@ -2258,7 +2261,7 @@
           <a:p>
             <a:fld id="{70D9F7AB-EA22-43B3-A547-9779962390FA}" type="slidenum">
               <a:rPr lang="nl-NL" smtClean="0"/>
-              <a:t>‹#›</a:t>
+              <a:t>‹nr.›</a:t>
             </a:fld>
             <a:endParaRPr lang="nl-NL"/>
           </a:p>
@@ -4485,7 +4488,7 @@
           <a:p>
             <a:fld id="{67D95C54-6F9B-4C49-BF56-4D62B2D71ED9}" type="datetimeFigureOut">
               <a:rPr lang="nl-NL" smtClean="0"/>
-              <a:t>11-01-2023</a:t>
+              <a:t>15-12-2023</a:t>
             </a:fld>
             <a:endParaRPr lang="nl-NL"/>
           </a:p>
@@ -4643,7 +4646,7 @@
           <a:p>
             <a:fld id="{03F426EE-4AAC-45A7-A5E5-372300C4F3E7}" type="slidenum">
               <a:rPr lang="nl-NL" smtClean="0"/>
-              <a:t>‹#›</a:t>
+              <a:t>‹nr.›</a:t>
             </a:fld>
             <a:endParaRPr lang="nl-NL"/>
           </a:p>
@@ -4817,7 +4820,7 @@
           <a:p>
             <a:fld id="{03F426EE-4AAC-45A7-A5E5-372300C4F3E7}" type="slidenum">
               <a:rPr lang="nl-NL" smtClean="0"/>
-              <a:t>19</a:t>
+              <a:t>22</a:t>
             </a:fld>
             <a:endParaRPr lang="nl-NL"/>
           </a:p>
@@ -4901,7 +4904,7 @@
           <a:p>
             <a:fld id="{03F426EE-4AAC-45A7-A5E5-372300C4F3E7}" type="slidenum">
               <a:rPr lang="nl-NL" smtClean="0"/>
-              <a:t>20</a:t>
+              <a:t>23</a:t>
             </a:fld>
             <a:endParaRPr lang="nl-NL"/>
           </a:p>
@@ -9050,6 +9053,311 @@
           <p:cNvPr id="2" name="Title 1">
             <a:extLst>
               <a:ext uri="{FF2B5EF4-FFF2-40B4-BE49-F238E27FC236}">
+                <a16:creationId xmlns:a16="http://schemas.microsoft.com/office/drawing/2014/main" id="{B7BE2E65-AE3F-1B6F-F7F8-EDDAA3756BC6}"/>
+              </a:ext>
+            </a:extLst>
+          </p:cNvPr>
+          <p:cNvSpPr>
+            <a:spLocks noGrp="1"/>
+          </p:cNvSpPr>
+          <p:nvPr>
+            <p:ph type="title"/>
+          </p:nvPr>
+        </p:nvSpPr>
+        <p:spPr/>
+        <p:txBody>
+          <a:bodyPr/>
+          <a:lstStyle/>
+          <a:p>
+            <a:r>
+              <a:rPr lang="en-NL" dirty="0"/>
+              <a:t>Knop die lamp aan en uit zet…..</a:t>
+            </a:r>
+          </a:p>
+        </p:txBody>
+      </p:sp>
+      <p:sp>
+        <p:nvSpPr>
+          <p:cNvPr id="3" name="Content Placeholder 2">
+            <a:extLst>
+              <a:ext uri="{FF2B5EF4-FFF2-40B4-BE49-F238E27FC236}">
+                <a16:creationId xmlns:a16="http://schemas.microsoft.com/office/drawing/2014/main" id="{0FFEC6E2-0653-D274-EA00-36526FC3A23E}"/>
+              </a:ext>
+            </a:extLst>
+          </p:cNvPr>
+          <p:cNvSpPr>
+            <a:spLocks noGrp="1"/>
+          </p:cNvSpPr>
+          <p:nvPr>
+            <p:ph sz="half" idx="2"/>
+          </p:nvPr>
+        </p:nvSpPr>
+        <p:spPr/>
+        <p:txBody>
+          <a:bodyPr/>
+          <a:lstStyle/>
+          <a:p>
+            <a:r>
+              <a:rPr lang="nl-NL" dirty="0"/>
+              <a:t>Maak de schakeling nu met een drukknop.</a:t>
+            </a:r>
+          </a:p>
+          <a:p>
+            <a:endParaRPr lang="nl-NL" dirty="0"/>
+          </a:p>
+          <a:p>
+            <a:r>
+              <a:rPr lang="nl-NL" dirty="0"/>
+              <a:t>Als de knop 1x wordt ingedrukt dan gaat de lamp aan.</a:t>
+            </a:r>
+          </a:p>
+          <a:p>
+            <a:r>
+              <a:rPr lang="nl-NL" dirty="0"/>
+              <a:t>Als de knop nogmaals wordt ingedrukt dan gaat de lamp uit.</a:t>
+            </a:r>
+          </a:p>
+        </p:txBody>
+      </p:sp>
+    </p:spTree>
+    <p:extLst>
+      <p:ext uri="{BB962C8B-B14F-4D97-AF65-F5344CB8AC3E}">
+        <p14:creationId xmlns:p14="http://schemas.microsoft.com/office/powerpoint/2010/main" val="3427329440"/>
+      </p:ext>
+    </p:extLst>
+  </p:cSld>
+  <p:clrMapOvr>
+    <a:masterClrMapping/>
+  </p:clrMapOvr>
+</p:sld>
+</file>
+
+<file path=ppt/slides/slide11.xml><?xml version="1.0" encoding="utf-8"?>
+<p:sld xmlns:a="http://schemas.openxmlformats.org/drawingml/2006/main" xmlns:r="http://schemas.openxmlformats.org/officeDocument/2006/relationships" xmlns:p="http://schemas.openxmlformats.org/presentationml/2006/main">
+  <p:cSld>
+    <p:spTree>
+      <p:nvGrpSpPr>
+        <p:cNvPr id="1" name=""/>
+        <p:cNvGrpSpPr/>
+        <p:nvPr/>
+      </p:nvGrpSpPr>
+      <p:grpSpPr>
+        <a:xfrm>
+          <a:off x="0" y="0"/>
+          <a:ext cx="0" cy="0"/>
+          <a:chOff x="0" y="0"/>
+          <a:chExt cx="0" cy="0"/>
+        </a:xfrm>
+      </p:grpSpPr>
+      <p:sp>
+        <p:nvSpPr>
+          <p:cNvPr id="2" name="Title 1">
+            <a:extLst>
+              <a:ext uri="{FF2B5EF4-FFF2-40B4-BE49-F238E27FC236}">
+                <a16:creationId xmlns:a16="http://schemas.microsoft.com/office/drawing/2014/main" id="{B7BE2E65-AE3F-1B6F-F7F8-EDDAA3756BC6}"/>
+              </a:ext>
+            </a:extLst>
+          </p:cNvPr>
+          <p:cNvSpPr>
+            <a:spLocks noGrp="1"/>
+          </p:cNvSpPr>
+          <p:nvPr>
+            <p:ph type="title"/>
+          </p:nvPr>
+        </p:nvSpPr>
+        <p:spPr/>
+        <p:txBody>
+          <a:bodyPr/>
+          <a:lstStyle/>
+          <a:p>
+            <a:r>
+              <a:rPr lang="en-NL" dirty="0"/>
+              <a:t>Knop die lamp aan en uit zet…..</a:t>
+            </a:r>
+          </a:p>
+        </p:txBody>
+      </p:sp>
+      <p:sp>
+        <p:nvSpPr>
+          <p:cNvPr id="3" name="Content Placeholder 2">
+            <a:extLst>
+              <a:ext uri="{FF2B5EF4-FFF2-40B4-BE49-F238E27FC236}">
+                <a16:creationId xmlns:a16="http://schemas.microsoft.com/office/drawing/2014/main" id="{0FFEC6E2-0653-D274-EA00-36526FC3A23E}"/>
+              </a:ext>
+            </a:extLst>
+          </p:cNvPr>
+          <p:cNvSpPr>
+            <a:spLocks noGrp="1"/>
+          </p:cNvSpPr>
+          <p:nvPr>
+            <p:ph sz="half" idx="2"/>
+          </p:nvPr>
+        </p:nvSpPr>
+        <p:spPr/>
+        <p:txBody>
+          <a:bodyPr/>
+          <a:lstStyle/>
+          <a:p>
+            <a:endParaRPr lang="en-NL" dirty="0"/>
+          </a:p>
+        </p:txBody>
+      </p:sp>
+      <p:pic>
+        <p:nvPicPr>
+          <p:cNvPr id="5" name="Picture 4">
+            <a:extLst>
+              <a:ext uri="{FF2B5EF4-FFF2-40B4-BE49-F238E27FC236}">
+                <a16:creationId xmlns:a16="http://schemas.microsoft.com/office/drawing/2014/main" id="{77C25B51-73C8-929C-4F3B-9FEAC1DB1A9B}"/>
+              </a:ext>
+            </a:extLst>
+          </p:cNvPr>
+          <p:cNvPicPr>
+            <a:picLocks noChangeAspect="1"/>
+          </p:cNvPicPr>
+          <p:nvPr/>
+        </p:nvPicPr>
+        <p:blipFill>
+          <a:blip r:embed="rId2"/>
+          <a:stretch>
+            <a:fillRect/>
+          </a:stretch>
+        </p:blipFill>
+        <p:spPr>
+          <a:xfrm>
+            <a:off x="697522" y="1499390"/>
+            <a:ext cx="11013832" cy="5173144"/>
+          </a:xfrm>
+          <a:prstGeom prst="rect">
+            <a:avLst/>
+          </a:prstGeom>
+        </p:spPr>
+      </p:pic>
+    </p:spTree>
+    <p:extLst>
+      <p:ext uri="{BB962C8B-B14F-4D97-AF65-F5344CB8AC3E}">
+        <p14:creationId xmlns:p14="http://schemas.microsoft.com/office/powerpoint/2010/main" val="1588329834"/>
+      </p:ext>
+    </p:extLst>
+  </p:cSld>
+  <p:clrMapOvr>
+    <a:masterClrMapping/>
+  </p:clrMapOvr>
+</p:sld>
+</file>
+
+<file path=ppt/slides/slide12.xml><?xml version="1.0" encoding="utf-8"?>
+<p:sld xmlns:a="http://schemas.openxmlformats.org/drawingml/2006/main" xmlns:r="http://schemas.openxmlformats.org/officeDocument/2006/relationships" xmlns:p="http://schemas.openxmlformats.org/presentationml/2006/main">
+  <p:cSld>
+    <p:spTree>
+      <p:nvGrpSpPr>
+        <p:cNvPr id="1" name=""/>
+        <p:cNvGrpSpPr/>
+        <p:nvPr/>
+      </p:nvGrpSpPr>
+      <p:grpSpPr>
+        <a:xfrm>
+          <a:off x="0" y="0"/>
+          <a:ext cx="0" cy="0"/>
+          <a:chOff x="0" y="0"/>
+          <a:chExt cx="0" cy="0"/>
+        </a:xfrm>
+      </p:grpSpPr>
+      <p:sp>
+        <p:nvSpPr>
+          <p:cNvPr id="2" name="Title 1">
+            <a:extLst>
+              <a:ext uri="{FF2B5EF4-FFF2-40B4-BE49-F238E27FC236}">
+                <a16:creationId xmlns:a16="http://schemas.microsoft.com/office/drawing/2014/main" id="{F5E40335-261F-F6DD-E7E2-4F2206378425}"/>
+              </a:ext>
+            </a:extLst>
+          </p:cNvPr>
+          <p:cNvSpPr>
+            <a:spLocks noGrp="1"/>
+          </p:cNvSpPr>
+          <p:nvPr>
+            <p:ph type="title"/>
+          </p:nvPr>
+        </p:nvSpPr>
+        <p:spPr/>
+        <p:txBody>
+          <a:bodyPr/>
+          <a:lstStyle/>
+          <a:p>
+            <a:r>
+              <a:rPr lang="en-NL" dirty="0"/>
+              <a:t>M</a:t>
+            </a:r>
+            <a:r>
+              <a:rPr lang="en-GB" dirty="0"/>
+              <a:t>o</a:t>
+            </a:r>
+            <a:r>
+              <a:rPr lang="en-NL" dirty="0"/>
+              <a:t>eten we iets aan de schakeling wijzigen ?</a:t>
+            </a:r>
+          </a:p>
+        </p:txBody>
+      </p:sp>
+      <p:sp>
+        <p:nvSpPr>
+          <p:cNvPr id="3" name="Content Placeholder 2">
+            <a:extLst>
+              <a:ext uri="{FF2B5EF4-FFF2-40B4-BE49-F238E27FC236}">
+                <a16:creationId xmlns:a16="http://schemas.microsoft.com/office/drawing/2014/main" id="{35A173CE-D0DC-D5DE-415A-1805C222FEA9}"/>
+              </a:ext>
+            </a:extLst>
+          </p:cNvPr>
+          <p:cNvSpPr>
+            <a:spLocks noGrp="1"/>
+          </p:cNvSpPr>
+          <p:nvPr>
+            <p:ph sz="half" idx="2"/>
+          </p:nvPr>
+        </p:nvSpPr>
+        <p:spPr/>
+        <p:txBody>
+          <a:bodyPr/>
+          <a:lstStyle/>
+          <a:p>
+            <a:endParaRPr lang="en-NL"/>
+          </a:p>
+        </p:txBody>
+      </p:sp>
+    </p:spTree>
+    <p:extLst>
+      <p:ext uri="{BB962C8B-B14F-4D97-AF65-F5344CB8AC3E}">
+        <p14:creationId xmlns:p14="http://schemas.microsoft.com/office/powerpoint/2010/main" val="69909324"/>
+      </p:ext>
+    </p:extLst>
+  </p:cSld>
+  <p:clrMapOvr>
+    <a:masterClrMapping/>
+  </p:clrMapOvr>
+</p:sld>
+</file>
+
+<file path=ppt/slides/slide13.xml><?xml version="1.0" encoding="utf-8"?>
+<p:sld xmlns:a="http://schemas.openxmlformats.org/drawingml/2006/main" xmlns:r="http://schemas.openxmlformats.org/officeDocument/2006/relationships" xmlns:p="http://schemas.openxmlformats.org/presentationml/2006/main">
+  <p:cSld>
+    <p:spTree>
+      <p:nvGrpSpPr>
+        <p:cNvPr id="1" name=""/>
+        <p:cNvGrpSpPr/>
+        <p:nvPr/>
+      </p:nvGrpSpPr>
+      <p:grpSpPr>
+        <a:xfrm>
+          <a:off x="0" y="0"/>
+          <a:ext cx="0" cy="0"/>
+          <a:chOff x="0" y="0"/>
+          <a:chExt cx="0" cy="0"/>
+        </a:xfrm>
+      </p:grpSpPr>
+      <p:sp>
+        <p:nvSpPr>
+          <p:cNvPr id="2" name="Title 1">
+            <a:extLst>
+              <a:ext uri="{FF2B5EF4-FFF2-40B4-BE49-F238E27FC236}">
                 <a16:creationId xmlns:a16="http://schemas.microsoft.com/office/drawing/2014/main" id="{F5E40335-261F-F6DD-E7E2-4F2206378425}"/>
               </a:ext>
             </a:extLst>
@@ -9151,7 +9459,7 @@
 </p:sld>
 </file>
 
-<file path=ppt/slides/slide11.xml><?xml version="1.0" encoding="utf-8"?>
+<file path=ppt/slides/slide14.xml><?xml version="1.0" encoding="utf-8"?>
 <p:sld xmlns:a="http://schemas.openxmlformats.org/drawingml/2006/main" xmlns:r="http://schemas.openxmlformats.org/officeDocument/2006/relationships" xmlns:p="http://schemas.openxmlformats.org/presentationml/2006/main">
   <p:cSld>
     <p:spTree>
@@ -9391,7 +9699,7 @@
 </p:sld>
 </file>
 
-<file path=ppt/slides/slide12.xml><?xml version="1.0" encoding="utf-8"?>
+<file path=ppt/slides/slide15.xml><?xml version="1.0" encoding="utf-8"?>
 <p:sld xmlns:a="http://schemas.openxmlformats.org/drawingml/2006/main" xmlns:r="http://schemas.openxmlformats.org/officeDocument/2006/relationships" xmlns:p="http://schemas.openxmlformats.org/presentationml/2006/main">
   <p:cSld>
     <p:spTree>
@@ -9682,7 +9990,7 @@
 </p:sld>
 </file>
 
-<file path=ppt/slides/slide13.xml><?xml version="1.0" encoding="utf-8"?>
+<file path=ppt/slides/slide16.xml><?xml version="1.0" encoding="utf-8"?>
 <p:sld xmlns:a="http://schemas.openxmlformats.org/drawingml/2006/main" xmlns:r="http://schemas.openxmlformats.org/officeDocument/2006/relationships" xmlns:p="http://schemas.openxmlformats.org/presentationml/2006/main">
   <p:cSld>
     <p:spTree>
@@ -10024,7 +10332,7 @@
 </p:sld>
 </file>
 
-<file path=ppt/slides/slide14.xml><?xml version="1.0" encoding="utf-8"?>
+<file path=ppt/slides/slide17.xml><?xml version="1.0" encoding="utf-8"?>
 <p:sld xmlns:a="http://schemas.openxmlformats.org/drawingml/2006/main" xmlns:r="http://schemas.openxmlformats.org/officeDocument/2006/relationships" xmlns:p="http://schemas.openxmlformats.org/presentationml/2006/main">
   <p:cSld>
     <p:spTree>
@@ -10565,7 +10873,7 @@
 </p:sld>
 </file>
 
-<file path=ppt/slides/slide15.xml><?xml version="1.0" encoding="utf-8"?>
+<file path=ppt/slides/slide18.xml><?xml version="1.0" encoding="utf-8"?>
 <p:sld xmlns:a="http://schemas.openxmlformats.org/drawingml/2006/main" xmlns:r="http://schemas.openxmlformats.org/officeDocument/2006/relationships" xmlns:p="http://schemas.openxmlformats.org/presentationml/2006/main">
   <p:cSld>
     <p:spTree>
@@ -11204,7 +11512,7 @@
 </p:sld>
 </file>
 
-<file path=ppt/slides/slide16.xml><?xml version="1.0" encoding="utf-8"?>
+<file path=ppt/slides/slide19.xml><?xml version="1.0" encoding="utf-8"?>
 <p:sld xmlns:a="http://schemas.openxmlformats.org/drawingml/2006/main" xmlns:r="http://schemas.openxmlformats.org/officeDocument/2006/relationships" xmlns:p="http://schemas.openxmlformats.org/presentationml/2006/main">
   <p:cSld>
     <p:spTree>
@@ -11771,7 +12079,120 @@
 </p:sld>
 </file>
 
-<file path=ppt/slides/slide17.xml><?xml version="1.0" encoding="utf-8"?>
+<file path=ppt/slides/slide2.xml><?xml version="1.0" encoding="utf-8"?>
+<p:sld xmlns:a="http://schemas.openxmlformats.org/drawingml/2006/main" xmlns:r="http://schemas.openxmlformats.org/officeDocument/2006/relationships" xmlns:p="http://schemas.openxmlformats.org/presentationml/2006/main">
+  <p:cSld>
+    <p:spTree>
+      <p:nvGrpSpPr>
+        <p:cNvPr id="1" name=""/>
+        <p:cNvGrpSpPr/>
+        <p:nvPr/>
+      </p:nvGrpSpPr>
+      <p:grpSpPr>
+        <a:xfrm>
+          <a:off x="0" y="0"/>
+          <a:ext cx="0" cy="0"/>
+          <a:chOff x="0" y="0"/>
+          <a:chExt cx="0" cy="0"/>
+        </a:xfrm>
+      </p:grpSpPr>
+      <p:sp>
+        <p:nvSpPr>
+          <p:cNvPr id="2" name="Title 1">
+            <a:extLst>
+              <a:ext uri="{FF2B5EF4-FFF2-40B4-BE49-F238E27FC236}">
+                <a16:creationId xmlns:a16="http://schemas.microsoft.com/office/drawing/2014/main" id="{E0EB025A-D5FD-DEB5-0540-5E91963B3922}"/>
+              </a:ext>
+            </a:extLst>
+          </p:cNvPr>
+          <p:cNvSpPr>
+            <a:spLocks noGrp="1"/>
+          </p:cNvSpPr>
+          <p:nvPr>
+            <p:ph type="title"/>
+          </p:nvPr>
+        </p:nvSpPr>
+        <p:spPr/>
+        <p:txBody>
+          <a:bodyPr/>
+          <a:lstStyle/>
+          <a:p>
+            <a:r>
+              <a:rPr lang="en-NL" dirty="0"/>
+              <a:t>Flowchart</a:t>
+            </a:r>
+          </a:p>
+        </p:txBody>
+      </p:sp>
+      <p:sp>
+        <p:nvSpPr>
+          <p:cNvPr id="3" name="Content Placeholder 2">
+            <a:extLst>
+              <a:ext uri="{FF2B5EF4-FFF2-40B4-BE49-F238E27FC236}">
+                <a16:creationId xmlns:a16="http://schemas.microsoft.com/office/drawing/2014/main" id="{E6FA4023-1F29-E8D4-7992-AD8F452F0562}"/>
+              </a:ext>
+            </a:extLst>
+          </p:cNvPr>
+          <p:cNvSpPr>
+            <a:spLocks noGrp="1"/>
+          </p:cNvSpPr>
+          <p:nvPr>
+            <p:ph sz="half" idx="2"/>
+          </p:nvPr>
+        </p:nvSpPr>
+        <p:spPr/>
+        <p:txBody>
+          <a:bodyPr/>
+          <a:lstStyle/>
+          <a:p>
+            <a:endParaRPr lang="en-NL"/>
+          </a:p>
+        </p:txBody>
+      </p:sp>
+      <p:pic>
+        <p:nvPicPr>
+          <p:cNvPr id="4" name="Picture 3">
+            <a:extLst>
+              <a:ext uri="{FF2B5EF4-FFF2-40B4-BE49-F238E27FC236}">
+                <a16:creationId xmlns:a16="http://schemas.microsoft.com/office/drawing/2014/main" id="{ED593C1F-1C88-BFC0-2B6B-8E871AA635E5}"/>
+              </a:ext>
+            </a:extLst>
+          </p:cNvPr>
+          <p:cNvPicPr>
+            <a:picLocks noChangeAspect="1"/>
+          </p:cNvPicPr>
+          <p:nvPr/>
+        </p:nvPicPr>
+        <p:blipFill>
+          <a:blip r:embed="rId2"/>
+          <a:stretch>
+            <a:fillRect/>
+          </a:stretch>
+        </p:blipFill>
+        <p:spPr>
+          <a:xfrm>
+            <a:off x="836611" y="1458198"/>
+            <a:ext cx="10515599" cy="5332756"/>
+          </a:xfrm>
+          <a:prstGeom prst="rect">
+            <a:avLst/>
+          </a:prstGeom>
+        </p:spPr>
+      </p:pic>
+    </p:spTree>
+    <p:extLst>
+      <p:ext uri="{BB962C8B-B14F-4D97-AF65-F5344CB8AC3E}">
+        <p14:creationId xmlns:p14="http://schemas.microsoft.com/office/powerpoint/2010/main" val="1745142829"/>
+      </p:ext>
+    </p:extLst>
+  </p:cSld>
+  <p:clrMapOvr>
+    <a:masterClrMapping/>
+  </p:clrMapOvr>
+</p:sld>
+</file>
+
+<file path=ppt/slides/slide20.xml><?xml version="1.0" encoding="utf-8"?>
 <p:sld xmlns:a="http://schemas.openxmlformats.org/drawingml/2006/main" xmlns:r="http://schemas.openxmlformats.org/officeDocument/2006/relationships" xmlns:p="http://schemas.openxmlformats.org/presentationml/2006/main">
   <p:cSld>
     <p:spTree>
@@ -12440,7 +12861,7 @@
 </p:sld>
 </file>
 
-<file path=ppt/slides/slide18.xml><?xml version="1.0" encoding="utf-8"?>
+<file path=ppt/slides/slide21.xml><?xml version="1.0" encoding="utf-8"?>
 <p:sld xmlns:a="http://schemas.openxmlformats.org/drawingml/2006/main" xmlns:r="http://schemas.openxmlformats.org/officeDocument/2006/relationships" xmlns:p="http://schemas.openxmlformats.org/presentationml/2006/main">
   <p:cSld>
     <p:spTree>
@@ -13380,7 +13801,7 @@
 </p:sld>
 </file>
 
-<file path=ppt/slides/slide19.xml><?xml version="1.0" encoding="utf-8"?>
+<file path=ppt/slides/slide22.xml><?xml version="1.0" encoding="utf-8"?>
 <p:sld xmlns:a="http://schemas.openxmlformats.org/drawingml/2006/main" xmlns:r="http://schemas.openxmlformats.org/officeDocument/2006/relationships" xmlns:p="http://schemas.openxmlformats.org/presentationml/2006/main">
   <p:cSld>
     <p:spTree>
@@ -14320,120 +14741,7 @@
 </p:sld>
 </file>
 
-<file path=ppt/slides/slide2.xml><?xml version="1.0" encoding="utf-8"?>
-<p:sld xmlns:a="http://schemas.openxmlformats.org/drawingml/2006/main" xmlns:r="http://schemas.openxmlformats.org/officeDocument/2006/relationships" xmlns:p="http://schemas.openxmlformats.org/presentationml/2006/main">
-  <p:cSld>
-    <p:spTree>
-      <p:nvGrpSpPr>
-        <p:cNvPr id="1" name=""/>
-        <p:cNvGrpSpPr/>
-        <p:nvPr/>
-      </p:nvGrpSpPr>
-      <p:grpSpPr>
-        <a:xfrm>
-          <a:off x="0" y="0"/>
-          <a:ext cx="0" cy="0"/>
-          <a:chOff x="0" y="0"/>
-          <a:chExt cx="0" cy="0"/>
-        </a:xfrm>
-      </p:grpSpPr>
-      <p:sp>
-        <p:nvSpPr>
-          <p:cNvPr id="2" name="Title 1">
-            <a:extLst>
-              <a:ext uri="{FF2B5EF4-FFF2-40B4-BE49-F238E27FC236}">
-                <a16:creationId xmlns:a16="http://schemas.microsoft.com/office/drawing/2014/main" id="{E0EB025A-D5FD-DEB5-0540-5E91963B3922}"/>
-              </a:ext>
-            </a:extLst>
-          </p:cNvPr>
-          <p:cNvSpPr>
-            <a:spLocks noGrp="1"/>
-          </p:cNvSpPr>
-          <p:nvPr>
-            <p:ph type="title"/>
-          </p:nvPr>
-        </p:nvSpPr>
-        <p:spPr/>
-        <p:txBody>
-          <a:bodyPr/>
-          <a:lstStyle/>
-          <a:p>
-            <a:r>
-              <a:rPr lang="en-NL" dirty="0"/>
-              <a:t>Flowchart</a:t>
-            </a:r>
-          </a:p>
-        </p:txBody>
-      </p:sp>
-      <p:sp>
-        <p:nvSpPr>
-          <p:cNvPr id="3" name="Content Placeholder 2">
-            <a:extLst>
-              <a:ext uri="{FF2B5EF4-FFF2-40B4-BE49-F238E27FC236}">
-                <a16:creationId xmlns:a16="http://schemas.microsoft.com/office/drawing/2014/main" id="{E6FA4023-1F29-E8D4-7992-AD8F452F0562}"/>
-              </a:ext>
-            </a:extLst>
-          </p:cNvPr>
-          <p:cNvSpPr>
-            <a:spLocks noGrp="1"/>
-          </p:cNvSpPr>
-          <p:nvPr>
-            <p:ph sz="half" idx="2"/>
-          </p:nvPr>
-        </p:nvSpPr>
-        <p:spPr/>
-        <p:txBody>
-          <a:bodyPr/>
-          <a:lstStyle/>
-          <a:p>
-            <a:endParaRPr lang="en-NL"/>
-          </a:p>
-        </p:txBody>
-      </p:sp>
-      <p:pic>
-        <p:nvPicPr>
-          <p:cNvPr id="4" name="Picture 3">
-            <a:extLst>
-              <a:ext uri="{FF2B5EF4-FFF2-40B4-BE49-F238E27FC236}">
-                <a16:creationId xmlns:a16="http://schemas.microsoft.com/office/drawing/2014/main" id="{ED593C1F-1C88-BFC0-2B6B-8E871AA635E5}"/>
-              </a:ext>
-            </a:extLst>
-          </p:cNvPr>
-          <p:cNvPicPr>
-            <a:picLocks noChangeAspect="1"/>
-          </p:cNvPicPr>
-          <p:nvPr/>
-        </p:nvPicPr>
-        <p:blipFill>
-          <a:blip r:embed="rId2"/>
-          <a:stretch>
-            <a:fillRect/>
-          </a:stretch>
-        </p:blipFill>
-        <p:spPr>
-          <a:xfrm>
-            <a:off x="836611" y="1458198"/>
-            <a:ext cx="10515599" cy="5332756"/>
-          </a:xfrm>
-          <a:prstGeom prst="rect">
-            <a:avLst/>
-          </a:prstGeom>
-        </p:spPr>
-      </p:pic>
-    </p:spTree>
-    <p:extLst>
-      <p:ext uri="{BB962C8B-B14F-4D97-AF65-F5344CB8AC3E}">
-        <p14:creationId xmlns:p14="http://schemas.microsoft.com/office/powerpoint/2010/main" val="1745142829"/>
-      </p:ext>
-    </p:extLst>
-  </p:cSld>
-  <p:clrMapOvr>
-    <a:masterClrMapping/>
-  </p:clrMapOvr>
-</p:sld>
-</file>
-
-<file path=ppt/slides/slide20.xml><?xml version="1.0" encoding="utf-8"?>
+<file path=ppt/slides/slide23.xml><?xml version="1.0" encoding="utf-8"?>
 <p:sld xmlns:a="http://schemas.openxmlformats.org/drawingml/2006/main" xmlns:r="http://schemas.openxmlformats.org/officeDocument/2006/relationships" xmlns:p="http://schemas.openxmlformats.org/presentationml/2006/main">
   <p:cSld>
     <p:spTree>
@@ -15445,7 +15753,7 @@
 </p:sld>
 </file>
 
-<file path=ppt/slides/slide21.xml><?xml version="1.0" encoding="utf-8"?>
+<file path=ppt/slides/slide24.xml><?xml version="1.0" encoding="utf-8"?>
 <p:sld xmlns:a="http://schemas.openxmlformats.org/drawingml/2006/main" xmlns:r="http://schemas.openxmlformats.org/officeDocument/2006/relationships" xmlns:p="http://schemas.openxmlformats.org/presentationml/2006/main">
   <p:cSld>
     <p:spTree>
@@ -15584,7 +15892,7 @@
 </p:sld>
 </file>
 
-<file path=ppt/slides/slide22.xml><?xml version="1.0" encoding="utf-8"?>
+<file path=ppt/slides/slide25.xml><?xml version="1.0" encoding="utf-8"?>
 <p:sld xmlns:a="http://schemas.openxmlformats.org/drawingml/2006/main" xmlns:r="http://schemas.openxmlformats.org/officeDocument/2006/relationships" xmlns:p="http://schemas.openxmlformats.org/presentationml/2006/main">
   <p:cSld>
     <p:spTree>
@@ -16160,10 +16468,10 @@
       </p:grpSpPr>
       <p:sp>
         <p:nvSpPr>
-          <p:cNvPr id="2" name="Title 1">
+          <p:cNvPr id="2" name="Titel 1">
             <a:extLst>
               <a:ext uri="{FF2B5EF4-FFF2-40B4-BE49-F238E27FC236}">
-                <a16:creationId xmlns:a16="http://schemas.microsoft.com/office/drawing/2014/main" id="{B7BE2E65-AE3F-1B6F-F7F8-EDDAA3756BC6}"/>
+                <a16:creationId xmlns:a16="http://schemas.microsoft.com/office/drawing/2014/main" id="{168D19FD-29CC-75AD-0E64-C5BA21D4B123}"/>
               </a:ext>
             </a:extLst>
           </p:cNvPr>
@@ -16180,18 +16488,22 @@
           <a:lstStyle/>
           <a:p>
             <a:r>
-              <a:rPr lang="en-NL" dirty="0"/>
-              <a:t>Knop die lamp aan en uit zet…..</a:t>
+              <a:rPr lang="nl-NL" dirty="0"/>
+              <a:t>Tips voor het opbouwen van een schakeling</a:t>
             </a:r>
+            <a:br>
+              <a:rPr lang="nl-NL" dirty="0"/>
+            </a:br>
+            <a:endParaRPr lang="nl-NL" dirty="0"/>
           </a:p>
         </p:txBody>
       </p:sp>
       <p:sp>
         <p:nvSpPr>
-          <p:cNvPr id="3" name="Content Placeholder 2">
+          <p:cNvPr id="3" name="Tijdelijke aanduiding voor inhoud 2">
             <a:extLst>
               <a:ext uri="{FF2B5EF4-FFF2-40B4-BE49-F238E27FC236}">
-                <a16:creationId xmlns:a16="http://schemas.microsoft.com/office/drawing/2014/main" id="{0FFEC6E2-0653-D274-EA00-36526FC3A23E}"/>
+                <a16:creationId xmlns:a16="http://schemas.microsoft.com/office/drawing/2014/main" id="{F9E6A0AB-2D3B-6645-84EB-52E44A031D57}"/>
               </a:ext>
             </a:extLst>
           </p:cNvPr>
@@ -16207,14 +16519,56 @@
           <a:bodyPr/>
           <a:lstStyle/>
           <a:p>
-            <a:endParaRPr lang="en-NL" dirty="0"/>
+            <a:r>
+              <a:rPr lang="nl-NL" dirty="0"/>
+              <a:t>Bouw het stap voor stap op. Niet alles tegelijk dan wordt je gek van de draden.</a:t>
+            </a:r>
+          </a:p>
+          <a:p>
+            <a:r>
+              <a:rPr lang="nl-NL" dirty="0"/>
+              <a:t>Een led niet gelijk op een GP poort, maar eerst even direct op 5V aansluiten. Als dat werkt dan pas op een GP Poort</a:t>
+            </a:r>
+          </a:p>
+          <a:p>
+            <a:r>
+              <a:rPr lang="nl-NL" dirty="0"/>
+              <a:t>Let op dat </a:t>
+            </a:r>
+            <a:r>
+              <a:rPr lang="nl-NL" dirty="0" err="1"/>
+              <a:t>vanalles</a:t>
+            </a:r>
+            <a:r>
+              <a:rPr lang="nl-NL" dirty="0"/>
+              <a:t> kapot kan zijn. Draadjes, Ledjes. Sluit eerst </a:t>
+            </a:r>
+            <a:r>
+              <a:rPr lang="nl-NL" dirty="0" err="1"/>
+              <a:t>vanalles</a:t>
+            </a:r>
+            <a:r>
+              <a:rPr lang="nl-NL" dirty="0"/>
+              <a:t> uit voordat je hulp vraagt.</a:t>
+            </a:r>
+          </a:p>
+          <a:p>
+            <a:r>
+              <a:rPr lang="nl-NL" dirty="0"/>
+              <a:t>Een LED heeft een anode en een kathode. Kijk goed of je dat goed </a:t>
+            </a:r>
+            <a:r>
+              <a:rPr lang="nl-NL"/>
+              <a:t>heb aangesloten.</a:t>
+            </a:r>
+            <a:endParaRPr lang="nl-NL" dirty="0"/>
           </a:p>
         </p:txBody>
       </p:sp>
     </p:spTree>
     <p:extLst>
       <p:ext uri="{BB962C8B-B14F-4D97-AF65-F5344CB8AC3E}">
-        <p14:creationId xmlns:p14="http://schemas.microsoft.com/office/powerpoint/2010/main" val="3427329440"/>
+        <p14:creationId xmlns:p14="http://schemas.microsoft.com/office/powerpoint/2010/main" val="3987919395"/>
       </p:ext>
     </p:extLst>
   </p:cSld>
@@ -16243,10 +16597,10 @@
       </p:grpSpPr>
       <p:sp>
         <p:nvSpPr>
-          <p:cNvPr id="2" name="Title 1">
+          <p:cNvPr id="2" name="Titel 1">
             <a:extLst>
               <a:ext uri="{FF2B5EF4-FFF2-40B4-BE49-F238E27FC236}">
-                <a16:creationId xmlns:a16="http://schemas.microsoft.com/office/drawing/2014/main" id="{B7BE2E65-AE3F-1B6F-F7F8-EDDAA3756BC6}"/>
+                <a16:creationId xmlns:a16="http://schemas.microsoft.com/office/drawing/2014/main" id="{168D19FD-29CC-75AD-0E64-C5BA21D4B123}"/>
               </a:ext>
             </a:extLst>
           </p:cNvPr>
@@ -16263,18 +16617,18 @@
           <a:lstStyle/>
           <a:p>
             <a:r>
-              <a:rPr lang="en-NL" dirty="0"/>
-              <a:t>Knop die lamp aan en uit zet…..</a:t>
+              <a:rPr lang="nl-NL" dirty="0"/>
+              <a:t>Debuggen</a:t>
             </a:r>
           </a:p>
         </p:txBody>
       </p:sp>
       <p:sp>
         <p:nvSpPr>
-          <p:cNvPr id="3" name="Content Placeholder 2">
+          <p:cNvPr id="3" name="Tijdelijke aanduiding voor inhoud 2">
             <a:extLst>
               <a:ext uri="{FF2B5EF4-FFF2-40B4-BE49-F238E27FC236}">
-                <a16:creationId xmlns:a16="http://schemas.microsoft.com/office/drawing/2014/main" id="{0FFEC6E2-0653-D274-EA00-36526FC3A23E}"/>
+                <a16:creationId xmlns:a16="http://schemas.microsoft.com/office/drawing/2014/main" id="{F9E6A0AB-2D3B-6645-84EB-52E44A031D57}"/>
               </a:ext>
             </a:extLst>
           </p:cNvPr>
@@ -16290,16 +16644,22 @@
           <a:bodyPr/>
           <a:lstStyle/>
           <a:p>
-            <a:endParaRPr lang="en-NL" dirty="0"/>
+            <a:r>
+              <a:rPr lang="nl-NL" dirty="0"/>
+              <a:t>Zet een multimeter op de schakeling om te kijken wat er gaande is.</a:t>
+            </a:r>
+          </a:p>
+          <a:p>
+            <a:endParaRPr lang="nl-NL" dirty="0"/>
           </a:p>
         </p:txBody>
       </p:sp>
       <p:pic>
         <p:nvPicPr>
-          <p:cNvPr id="5" name="Picture 4">
+          <p:cNvPr id="5" name="Afbeelding 4">
             <a:extLst>
               <a:ext uri="{FF2B5EF4-FFF2-40B4-BE49-F238E27FC236}">
-                <a16:creationId xmlns:a16="http://schemas.microsoft.com/office/drawing/2014/main" id="{77C25B51-73C8-929C-4F3B-9FEAC1DB1A9B}"/>
+                <a16:creationId xmlns:a16="http://schemas.microsoft.com/office/drawing/2014/main" id="{274F59D9-2F36-E020-616F-6E352AE366FE}"/>
               </a:ext>
             </a:extLst>
           </p:cNvPr>
@@ -16316,8 +16676,8 @@
         </p:blipFill>
         <p:spPr>
           <a:xfrm>
-            <a:off x="697522" y="1499390"/>
-            <a:ext cx="11013832" cy="5173144"/>
+            <a:off x="837600" y="2277556"/>
+            <a:ext cx="5463706" cy="4034556"/>
           </a:xfrm>
           <a:prstGeom prst="rect">
             <a:avLst/>
@@ -16327,7 +16687,7 @@
     </p:spTree>
     <p:extLst>
       <p:ext uri="{BB962C8B-B14F-4D97-AF65-F5344CB8AC3E}">
-        <p14:creationId xmlns:p14="http://schemas.microsoft.com/office/powerpoint/2010/main" val="1588329834"/>
+        <p14:creationId xmlns:p14="http://schemas.microsoft.com/office/powerpoint/2010/main" val="3740442413"/>
       </p:ext>
     </p:extLst>
   </p:cSld>
@@ -16356,10 +16716,10 @@
       </p:grpSpPr>
       <p:sp>
         <p:nvSpPr>
-          <p:cNvPr id="2" name="Title 1">
+          <p:cNvPr id="2" name="Titel 1">
             <a:extLst>
               <a:ext uri="{FF2B5EF4-FFF2-40B4-BE49-F238E27FC236}">
-                <a16:creationId xmlns:a16="http://schemas.microsoft.com/office/drawing/2014/main" id="{F5E40335-261F-F6DD-E7E2-4F2206378425}"/>
+                <a16:creationId xmlns:a16="http://schemas.microsoft.com/office/drawing/2014/main" id="{168D19FD-29CC-75AD-0E64-C5BA21D4B123}"/>
               </a:ext>
             </a:extLst>
           </p:cNvPr>
@@ -16376,26 +16736,18 @@
           <a:lstStyle/>
           <a:p>
             <a:r>
-              <a:rPr lang="en-NL" dirty="0"/>
-              <a:t>M</a:t>
-            </a:r>
-            <a:r>
-              <a:rPr lang="en-GB" dirty="0"/>
-              <a:t>o</a:t>
-            </a:r>
-            <a:r>
-              <a:rPr lang="en-NL" dirty="0"/>
-              <a:t>eten we iets aan de schakeling wijzigen ?</a:t>
+              <a:rPr lang="nl-NL" dirty="0"/>
+              <a:t>Debuggen</a:t>
             </a:r>
           </a:p>
         </p:txBody>
       </p:sp>
       <p:sp>
         <p:nvSpPr>
-          <p:cNvPr id="3" name="Content Placeholder 2">
+          <p:cNvPr id="3" name="Tijdelijke aanduiding voor inhoud 2">
             <a:extLst>
               <a:ext uri="{FF2B5EF4-FFF2-40B4-BE49-F238E27FC236}">
-                <a16:creationId xmlns:a16="http://schemas.microsoft.com/office/drawing/2014/main" id="{35A173CE-D0DC-D5DE-415A-1805C222FEA9}"/>
+                <a16:creationId xmlns:a16="http://schemas.microsoft.com/office/drawing/2014/main" id="{F9E6A0AB-2D3B-6645-84EB-52E44A031D57}"/>
               </a:ext>
             </a:extLst>
           </p:cNvPr>
@@ -16411,14 +16763,55 @@
           <a:bodyPr/>
           <a:lstStyle/>
           <a:p>
-            <a:endParaRPr lang="en-NL"/>
+            <a:r>
+              <a:rPr lang="nl-NL" dirty="0"/>
+              <a:t>Schrijf naar de </a:t>
+            </a:r>
+            <a:r>
+              <a:rPr lang="nl-NL" dirty="0" err="1"/>
+              <a:t>Serial</a:t>
+            </a:r>
+            <a:r>
+              <a:rPr lang="nl-NL" dirty="0"/>
+              <a:t> monitor om te kijken wat er in de code gaande is.</a:t>
+            </a:r>
           </a:p>
         </p:txBody>
       </p:sp>
+      <p:pic>
+        <p:nvPicPr>
+          <p:cNvPr id="6" name="Afbeelding 5">
+            <a:extLst>
+              <a:ext uri="{FF2B5EF4-FFF2-40B4-BE49-F238E27FC236}">
+                <a16:creationId xmlns:a16="http://schemas.microsoft.com/office/drawing/2014/main" id="{FC7ABF44-8F01-B650-FC87-D6AE36159155}"/>
+              </a:ext>
+            </a:extLst>
+          </p:cNvPr>
+          <p:cNvPicPr>
+            <a:picLocks noChangeAspect="1"/>
+          </p:cNvPicPr>
+          <p:nvPr/>
+        </p:nvPicPr>
+        <p:blipFill>
+          <a:blip r:embed="rId2"/>
+          <a:stretch>
+            <a:fillRect/>
+          </a:stretch>
+        </p:blipFill>
+        <p:spPr>
+          <a:xfrm>
+            <a:off x="837600" y="2274766"/>
+            <a:ext cx="7680758" cy="4480441"/>
+          </a:xfrm>
+          <a:prstGeom prst="rect">
+            <a:avLst/>
+          </a:prstGeom>
+        </p:spPr>
+      </p:pic>
     </p:spTree>
     <p:extLst>
       <p:ext uri="{BB962C8B-B14F-4D97-AF65-F5344CB8AC3E}">
-        <p14:creationId xmlns:p14="http://schemas.microsoft.com/office/powerpoint/2010/main" val="69909324"/>
+        <p14:creationId xmlns:p14="http://schemas.microsoft.com/office/powerpoint/2010/main" val="856895762"/>
       </p:ext>
     </p:extLst>
   </p:cSld>
@@ -17541,15 +17934,6 @@
 </file>
 
 <file path=customXml/item1.xml><?xml version="1.0" encoding="utf-8"?>
-<?mso-contentType ?>
-<FormTemplates xmlns="http://schemas.microsoft.com/sharepoint/v3/contenttype/forms">
-  <Display>DocumentLibraryForm</Display>
-  <Edit>DocumentLibraryForm</Edit>
-  <New>DocumentLibraryForm</New>
-</FormTemplates>
-</file>
-
-<file path=customXml/item2.xml><?xml version="1.0" encoding="utf-8"?>
 <ct:contentTypeSchema xmlns:ct="http://schemas.microsoft.com/office/2006/metadata/contentType" xmlns:ma="http://schemas.microsoft.com/office/2006/metadata/properties/metaAttributes" ct:_="" ma:_="" ma:contentTypeName="Document" ma:contentTypeID="0x0101004EE29C275B0330428D2BFA2C8D576F4B" ma:contentTypeVersion="0" ma:contentTypeDescription="Een nieuw document maken." ma:contentTypeScope="" ma:versionID="6f3e0ea117c09d99e40ae3b100a299dc">
   <xsd:schema xmlns:xsd="http://www.w3.org/2001/XMLSchema" xmlns:xs="http://www.w3.org/2001/XMLSchema" xmlns:p="http://schemas.microsoft.com/office/2006/metadata/properties" targetNamespace="http://schemas.microsoft.com/office/2006/metadata/properties" ma:root="true" ma:fieldsID="1978a156f712f99d6452530788f7ffe9">
     <xsd:element name="properties">
@@ -17663,6 +18047,15 @@
 </ct:contentTypeSchema>
 </file>
 
+<file path=customXml/item2.xml><?xml version="1.0" encoding="utf-8"?>
+<?mso-contentType ?>
+<FormTemplates xmlns="http://schemas.microsoft.com/sharepoint/v3/contenttype/forms">
+  <Display>DocumentLibraryForm</Display>
+  <Edit>DocumentLibraryForm</Edit>
+  <New>DocumentLibraryForm</New>
+</FormTemplates>
+</file>
+
 <file path=customXml/item3.xml><?xml version="1.0" encoding="utf-8"?>
 <p:properties xmlns:p="http://schemas.microsoft.com/office/2006/metadata/properties" xmlns:xsi="http://www.w3.org/2001/XMLSchema-instance" xmlns:pc="http://schemas.microsoft.com/office/infopath/2007/PartnerControls">
   <documentManagement/>
@@ -17670,14 +18063,6 @@
 </file>
 
 <file path=customXml/itemProps1.xml><?xml version="1.0" encoding="utf-8"?>
-<ds:datastoreItem xmlns:ds="http://schemas.openxmlformats.org/officeDocument/2006/customXml" ds:itemID="{C58370CC-8AF3-4E85-911D-3C7AD1FAAE10}">
-  <ds:schemaRefs>
-    <ds:schemaRef ds:uri="http://schemas.microsoft.com/sharepoint/v3/contenttype/forms"/>
-  </ds:schemaRefs>
-</ds:datastoreItem>
-</file>
-
-<file path=customXml/itemProps2.xml><?xml version="1.0" encoding="utf-8"?>
 <ds:datastoreItem xmlns:ds="http://schemas.openxmlformats.org/officeDocument/2006/customXml" ds:itemID="{7C812B3D-632E-45B1-BE3D-5F5FC6F96A1A}">
   <ds:schemaRefs>
     <ds:schemaRef ds:uri="http://schemas.microsoft.com/office/2006/metadata/contentType"/>
@@ -17689,6 +18074,14 @@
     <ds:schemaRef ds:uri="http://purl.org/dc/terms/"/>
     <ds:schemaRef ds:uri="http://schemas.microsoft.com/internal/obd"/>
     <ds:schemaRef ds:uri="http://schemas.microsoft.com/office/infopath/2007/PartnerControls"/>
+  </ds:schemaRefs>
+</ds:datastoreItem>
+</file>
+
+<file path=customXml/itemProps2.xml><?xml version="1.0" encoding="utf-8"?>
+<ds:datastoreItem xmlns:ds="http://schemas.openxmlformats.org/officeDocument/2006/customXml" ds:itemID="{C58370CC-8AF3-4E85-911D-3C7AD1FAAE10}">
+  <ds:schemaRefs>
+    <ds:schemaRef ds:uri="http://schemas.microsoft.com/sharepoint/v3/contenttype/forms"/>
   </ds:schemaRefs>
 </ds:datastoreItem>
 </file>

</xml_diff>